<commit_message>
Final write up additions
</commit_message>
<xml_diff>
--- a/Write-ups/FinalPresentation.pptx
+++ b/Write-ups/FinalPresentation.pptx
@@ -288,7 +288,7 @@
           <a:p>
             <a:fld id="{C4EEF32B-FBB3-0645-BD71-292A30FC7C81}" type="datetimeFigureOut">
               <a:rPr lang="en-US" smtClean="0"/>
-              <a:t>11/17/2014</a:t>
+              <a:t>11/21/2014</a:t>
             </a:fld>
             <a:endParaRPr lang="en-US"/>
           </a:p>
@@ -458,7 +458,7 @@
           <a:p>
             <a:fld id="{C4EEF32B-FBB3-0645-BD71-292A30FC7C81}" type="datetimeFigureOut">
               <a:rPr lang="en-US" smtClean="0"/>
-              <a:t>11/17/2014</a:t>
+              <a:t>11/21/2014</a:t>
             </a:fld>
             <a:endParaRPr lang="en-US"/>
           </a:p>
@@ -638,7 +638,7 @@
           <a:p>
             <a:fld id="{C4EEF32B-FBB3-0645-BD71-292A30FC7C81}" type="datetimeFigureOut">
               <a:rPr lang="en-US" smtClean="0"/>
-              <a:t>11/17/2014</a:t>
+              <a:t>11/21/2014</a:t>
             </a:fld>
             <a:endParaRPr lang="en-US"/>
           </a:p>
@@ -808,7 +808,7 @@
           <a:p>
             <a:fld id="{C4EEF32B-FBB3-0645-BD71-292A30FC7C81}" type="datetimeFigureOut">
               <a:rPr lang="en-US" smtClean="0"/>
-              <a:t>11/17/2014</a:t>
+              <a:t>11/21/2014</a:t>
             </a:fld>
             <a:endParaRPr lang="en-US"/>
           </a:p>
@@ -1054,7 +1054,7 @@
           <a:p>
             <a:fld id="{C4EEF32B-FBB3-0645-BD71-292A30FC7C81}" type="datetimeFigureOut">
               <a:rPr lang="en-US" smtClean="0"/>
-              <a:t>11/17/2014</a:t>
+              <a:t>11/21/2014</a:t>
             </a:fld>
             <a:endParaRPr lang="en-US"/>
           </a:p>
@@ -1342,7 +1342,7 @@
           <a:p>
             <a:fld id="{C4EEF32B-FBB3-0645-BD71-292A30FC7C81}" type="datetimeFigureOut">
               <a:rPr lang="en-US" smtClean="0"/>
-              <a:t>11/17/2014</a:t>
+              <a:t>11/21/2014</a:t>
             </a:fld>
             <a:endParaRPr lang="en-US"/>
           </a:p>
@@ -1764,7 +1764,7 @@
           <a:p>
             <a:fld id="{C4EEF32B-FBB3-0645-BD71-292A30FC7C81}" type="datetimeFigureOut">
               <a:rPr lang="en-US" smtClean="0"/>
-              <a:t>11/17/2014</a:t>
+              <a:t>11/21/2014</a:t>
             </a:fld>
             <a:endParaRPr lang="en-US"/>
           </a:p>
@@ -1882,7 +1882,7 @@
           <a:p>
             <a:fld id="{C4EEF32B-FBB3-0645-BD71-292A30FC7C81}" type="datetimeFigureOut">
               <a:rPr lang="en-US" smtClean="0"/>
-              <a:t>11/17/2014</a:t>
+              <a:t>11/21/2014</a:t>
             </a:fld>
             <a:endParaRPr lang="en-US"/>
           </a:p>
@@ -1977,7 +1977,7 @@
           <a:p>
             <a:fld id="{C4EEF32B-FBB3-0645-BD71-292A30FC7C81}" type="datetimeFigureOut">
               <a:rPr lang="en-US" smtClean="0"/>
-              <a:t>11/17/2014</a:t>
+              <a:t>11/21/2014</a:t>
             </a:fld>
             <a:endParaRPr lang="en-US"/>
           </a:p>
@@ -2254,7 +2254,7 @@
           <a:p>
             <a:fld id="{C4EEF32B-FBB3-0645-BD71-292A30FC7C81}" type="datetimeFigureOut">
               <a:rPr lang="en-US" smtClean="0"/>
-              <a:t>11/17/2014</a:t>
+              <a:t>11/21/2014</a:t>
             </a:fld>
             <a:endParaRPr lang="en-US"/>
           </a:p>
@@ -2507,7 +2507,7 @@
           <a:p>
             <a:fld id="{C4EEF32B-FBB3-0645-BD71-292A30FC7C81}" type="datetimeFigureOut">
               <a:rPr lang="en-US" smtClean="0"/>
-              <a:t>11/17/2014</a:t>
+              <a:t>11/21/2014</a:t>
             </a:fld>
             <a:endParaRPr lang="en-US"/>
           </a:p>
@@ -2720,7 +2720,7 @@
           <a:p>
             <a:fld id="{C4EEF32B-FBB3-0645-BD71-292A30FC7C81}" type="datetimeFigureOut">
               <a:rPr lang="en-US" smtClean="0"/>
-              <a:t>11/17/2014</a:t>
+              <a:t>11/21/2014</a:t>
             </a:fld>
             <a:endParaRPr lang="en-US"/>
           </a:p>
@@ -3103,10 +3103,10 @@
         </p:nvGrpSpPr>
         <p:grpSpPr>
           <a:xfrm>
-            <a:off x="0" y="1294881"/>
-            <a:ext cx="9491338" cy="4910511"/>
-            <a:chOff x="0" y="1294881"/>
-            <a:chExt cx="9491338" cy="4910511"/>
+            <a:off x="353961" y="1294881"/>
+            <a:ext cx="8213161" cy="4910511"/>
+            <a:chOff x="328621" y="1294881"/>
+            <a:chExt cx="8213161" cy="4910511"/>
           </a:xfrm>
         </p:grpSpPr>
         <p:grpSp>
@@ -3117,10 +3117,10 @@
           </p:nvGrpSpPr>
           <p:grpSpPr>
             <a:xfrm>
-              <a:off x="25340" y="1294881"/>
-              <a:ext cx="9465998" cy="4910511"/>
-              <a:chOff x="25340" y="1294881"/>
-              <a:chExt cx="9465998" cy="4910511"/>
+              <a:off x="328621" y="1294881"/>
+              <a:ext cx="8213161" cy="4910511"/>
+              <a:chOff x="328621" y="1294881"/>
+              <a:chExt cx="8213161" cy="4910511"/>
             </a:xfrm>
           </p:grpSpPr>
           <p:sp>
@@ -4786,8 +4786,8 @@
             </p:nvSpPr>
             <p:spPr>
               <a:xfrm>
-                <a:off x="150375" y="1801304"/>
-                <a:ext cx="1594283" cy="461665"/>
+                <a:off x="481062" y="1801304"/>
+                <a:ext cx="712054" cy="461665"/>
               </a:xfrm>
               <a:prstGeom prst="rect">
                 <a:avLst/>
@@ -4802,7 +4802,7 @@
               <a:p>
                 <a:r>
                   <a:rPr lang="en-US" sz="2400" b="1" dirty="0" smtClean="0"/>
-                  <a:t>Weather(t)</a:t>
+                  <a:t>X(n)</a:t>
                 </a:r>
                 <a:endParaRPr lang="en-US" sz="2400" b="1" dirty="0"/>
               </a:p>
@@ -4816,8 +4816,8 @@
             </p:nvSpPr>
             <p:spPr>
               <a:xfrm>
-                <a:off x="25340" y="3412471"/>
-                <a:ext cx="1844351" cy="461665"/>
+                <a:off x="328621" y="3412471"/>
+                <a:ext cx="962123" cy="461665"/>
               </a:xfrm>
               <a:prstGeom prst="rect">
                 <a:avLst/>
@@ -4832,7 +4832,7 @@
               <a:p>
                 <a:r>
                   <a:rPr lang="en-US" sz="2400" b="1" dirty="0" smtClean="0"/>
-                  <a:t>Weather(t-4)</a:t>
+                  <a:t>X(n-6)</a:t>
                 </a:r>
                 <a:endParaRPr lang="en-US" sz="2400" b="1" dirty="0"/>
               </a:p>
@@ -5717,7 +5717,7 @@
             <p:spPr>
               <a:xfrm>
                 <a:off x="7587675" y="1716109"/>
-                <a:ext cx="1903663" cy="461665"/>
+                <a:ext cx="954107" cy="461665"/>
               </a:xfrm>
               <a:prstGeom prst="rect">
                 <a:avLst/>
@@ -5731,8 +5731,12 @@
               <a:lstStyle/>
               <a:p>
                 <a:r>
+                  <a:rPr lang="en-US" sz="2400" b="1" smtClean="0"/>
+                  <a:t>Y(t+1</a:t>
+                </a:r>
+                <a:r>
                   <a:rPr lang="en-US" sz="2400" b="1" dirty="0" smtClean="0"/>
-                  <a:t>Weather(t+1)</a:t>
+                  <a:t>)</a:t>
                 </a:r>
               </a:p>
             </p:txBody>
@@ -5806,8 +5810,8 @@
           </p:nvSpPr>
           <p:spPr>
             <a:xfrm>
-              <a:off x="0" y="5041181"/>
-              <a:ext cx="1844351" cy="461665"/>
+              <a:off x="419977" y="5083126"/>
+              <a:ext cx="962123" cy="461665"/>
             </a:xfrm>
             <a:prstGeom prst="rect">
               <a:avLst/>
@@ -5822,13 +5826,43 @@
             <a:p>
               <a:r>
                 <a:rPr lang="en-US" sz="2400" b="1" dirty="0" smtClean="0"/>
-                <a:t>Weather(t-8)</a:t>
+                <a:t>X(n-7)</a:t>
               </a:r>
               <a:endParaRPr lang="en-US" sz="2400" b="1" dirty="0"/>
             </a:p>
           </p:txBody>
         </p:sp>
       </p:grpSp>
+      <p:sp>
+        <p:nvSpPr>
+          <p:cNvPr id="2" name="TextBox 1"/>
+          <p:cNvSpPr txBox="1"/>
+          <p:nvPr/>
+        </p:nvSpPr>
+        <p:spPr>
+          <a:xfrm>
+            <a:off x="353961" y="2393368"/>
+            <a:ext cx="152441" cy="584775"/>
+          </a:xfrm>
+          <a:prstGeom prst="rect">
+            <a:avLst/>
+          </a:prstGeom>
+          <a:noFill/>
+        </p:spPr>
+        <p:txBody>
+          <a:bodyPr wrap="square" rtlCol="0">
+            <a:spAutoFit/>
+          </a:bodyPr>
+          <a:lstStyle/>
+          <a:p>
+            <a:r>
+              <a:rPr lang="en-US" sz="3200" dirty="0" smtClean="0"/>
+              <a:t>…</a:t>
+            </a:r>
+            <a:endParaRPr lang="en-US" sz="3200" dirty="0"/>
+          </a:p>
+        </p:txBody>
+      </p:sp>
     </p:spTree>
     <p:extLst>
       <p:ext uri="{BB962C8B-B14F-4D97-AF65-F5344CB8AC3E}">

</xml_diff>